<commit_message>
generate library book late return analysis
</commit_message>
<xml_diff>
--- a/LIBRARY_BOOKS_LATE_RETURN_ANALYTICS_REPORT.pptx
+++ b/LIBRARY_BOOKS_LATE_RETURN_ANALYTICS_REPORT.pptx
@@ -9353,7 +9353,7 @@
           <a:graphicData uri="http://schemas.openxmlformats.org/presentationml/2006/ole">
             <mc:AlternateContent xmlns:mc="http://schemas.openxmlformats.org/markup-compatibility/2006">
               <mc:Choice xmlns:v="urn:schemas-microsoft-com:vml" Requires="v">
-                <p:oleObj spid="_x0000_s1096" name="think-cell Slide" r:id="rId15" imgW="444" imgH="443" progId="TCLayout.ActiveDocument.1">
+                <p:oleObj spid="_x0000_s1098" name="think-cell Slide" r:id="rId15" imgW="444" imgH="443" progId="TCLayout.ActiveDocument.1">
                   <p:embed/>
                 </p:oleObj>
               </mc:Choice>
@@ -9962,7 +9962,7 @@
           <a:graphicData uri="http://schemas.openxmlformats.org/presentationml/2006/ole">
             <mc:AlternateContent xmlns:mc="http://schemas.openxmlformats.org/markup-compatibility/2006">
               <mc:Choice xmlns:v="urn:schemas-microsoft-com:vml" Requires="v">
-                <p:oleObj spid="_x0000_s14346" name="think-cell Slide" r:id="rId5" imgW="444" imgH="443" progId="TCLayout.ActiveDocument.1">
+                <p:oleObj spid="_x0000_s14348" name="think-cell Slide" r:id="rId5" imgW="444" imgH="443" progId="TCLayout.ActiveDocument.1">
                   <p:embed/>
                 </p:oleObj>
               </mc:Choice>
@@ -10073,7 +10073,7 @@
           <a:graphicData uri="http://schemas.openxmlformats.org/presentationml/2006/ole">
             <mc:AlternateContent xmlns:mc="http://schemas.openxmlformats.org/markup-compatibility/2006">
               <mc:Choice xmlns:v="urn:schemas-microsoft-com:vml" Requires="v">
-                <p:oleObj spid="_x0000_s4186" name="think-cell Slide" r:id="rId61" imgW="444" imgH="443" progId="TCLayout.ActiveDocument.1">
+                <p:oleObj spid="_x0000_s4188" name="think-cell Slide" r:id="rId61" imgW="444" imgH="443" progId="TCLayout.ActiveDocument.1">
                   <p:embed/>
                 </p:oleObj>
               </mc:Choice>
@@ -11647,7 +11647,7 @@
         <p:spPr>
           <a:xfrm>
             <a:off x="200489" y="104382"/>
-            <a:ext cx="14187816" cy="461665"/>
+            <a:ext cx="11776491" cy="461665"/>
           </a:xfrm>
           <a:prstGeom prst="rect">
             <a:avLst/>
@@ -11677,6 +11677,15 @@
               <a:defRPr/>
             </a:pPr>
             <a:r>
+              <a:rPr lang="en-US" sz="2400" b="1" dirty="0" smtClean="0">
+                <a:solidFill>
+                  <a:srgbClr val="06486E"/>
+                </a:solidFill>
+                <a:latin typeface="Corbel" panose="020B0503020204020204" pitchFamily="34" charset="0"/>
+              </a:rPr>
+              <a:t>Book </a:t>
+            </a:r>
+            <a:r>
               <a:rPr kumimoji="0" lang="en-US" sz="2400" b="1" i="0" u="none" strike="noStrike" kern="1200" cap="none" spc="0" normalizeH="0" baseline="0" noProof="0" dirty="0" smtClean="0">
                 <a:ln>
                   <a:noFill/>
@@ -11691,7 +11700,58 @@
                 <a:ea typeface="+mn-ea"/>
                 <a:cs typeface="+mn-cs"/>
               </a:rPr>
-              <a:t>Customer Checkouts Analysis</a:t>
+              <a:t>Checkout</a:t>
+            </a:r>
+            <a:r>
+              <a:rPr kumimoji="0" lang="en-US" sz="2400" b="1" i="0" u="none" strike="noStrike" kern="1200" cap="none" spc="0" normalizeH="0" noProof="0" dirty="0" smtClean="0">
+                <a:ln>
+                  <a:noFill/>
+                </a:ln>
+                <a:solidFill>
+                  <a:srgbClr val="06486E"/>
+                </a:solidFill>
+                <a:effectLst/>
+                <a:uLnTx/>
+                <a:uFillTx/>
+                <a:latin typeface="Corbel" panose="020B0503020204020204" pitchFamily="34" charset="0"/>
+                <a:ea typeface="+mn-ea"/>
+                <a:cs typeface="+mn-cs"/>
+              </a:rPr>
+              <a:t> and Return</a:t>
+            </a:r>
+            <a:r>
+              <a:rPr kumimoji="0" lang="en-US" sz="2400" b="1" i="0" u="none" strike="noStrike" kern="1200" cap="none" spc="0" normalizeH="0" baseline="0" noProof="0" dirty="0" smtClean="0">
+                <a:ln>
+                  <a:noFill/>
+                </a:ln>
+                <a:solidFill>
+                  <a:srgbClr val="06486E"/>
+                </a:solidFill>
+                <a:effectLst/>
+                <a:uLnTx/>
+                <a:uFillTx/>
+                <a:latin typeface="Corbel" panose="020B0503020204020204" pitchFamily="34" charset="0"/>
+                <a:ea typeface="+mn-ea"/>
+                <a:cs typeface="+mn-cs"/>
+              </a:rPr>
+              <a:t> </a:t>
+            </a:r>
+            <a:r>
+              <a:rPr kumimoji="0" lang="en-US" sz="2400" b="1" i="0" u="none" strike="noStrike" kern="1200" cap="none" spc="0" normalizeH="0" baseline="0" noProof="0" dirty="0" smtClean="0">
+                <a:ln>
+                  <a:noFill/>
+                </a:ln>
+                <a:solidFill>
+                  <a:srgbClr val="06486E"/>
+                </a:solidFill>
+                <a:effectLst/>
+                <a:uLnTx/>
+                <a:uFillTx/>
+                <a:latin typeface="Corbel" panose="020B0503020204020204" pitchFamily="34" charset="0"/>
+                <a:ea typeface="+mn-ea"/>
+                <a:cs typeface="+mn-cs"/>
+              </a:rPr>
+              <a:t>Analysis</a:t>
             </a:r>
             <a:endParaRPr kumimoji="0" lang="en-US" sz="2400" b="1" i="0" u="none" strike="noStrike" kern="1200" cap="none" spc="0" normalizeH="0" baseline="0" noProof="0" dirty="0">
               <a:ln>
@@ -20308,7 +20368,7 @@
           <a:graphicData uri="http://schemas.openxmlformats.org/presentationml/2006/ole">
             <mc:AlternateContent xmlns:mc="http://schemas.openxmlformats.org/markup-compatibility/2006">
               <mc:Choice xmlns:v="urn:schemas-microsoft-com:vml" Requires="v">
-                <p:oleObj spid="_x0000_s12356" name="think-cell Slide" r:id="rId50" imgW="444" imgH="443" progId="TCLayout.ActiveDocument.1">
+                <p:oleObj spid="_x0000_s12358" name="think-cell Slide" r:id="rId50" imgW="444" imgH="443" progId="TCLayout.ActiveDocument.1">
                   <p:embed/>
                 </p:oleObj>
               </mc:Choice>
@@ -23520,16 +23580,7 @@
                 </a:solidFill>
                 <a:latin typeface="Corbel" panose="020B0503020204020204" pitchFamily="34" charset="0"/>
               </a:rPr>
-              <a:t>Books above 500 pages are returned late than books with less than 50 pages. Also, the price of books is seen to have an impact on the late returns of books as more customers checkout books within 100.00 and 500.00 price range</a:t>
-            </a:r>
-            <a:r>
-              <a:rPr lang="en-US" sz="1200" dirty="0" smtClean="0">
-                <a:solidFill>
-                  <a:srgbClr val="002060"/>
-                </a:solidFill>
-                <a:latin typeface="Corbel" panose="020B0503020204020204" pitchFamily="34" charset="0"/>
-              </a:rPr>
-              <a:t>. However, 29% of customers who lives in Washington return books after 28 days which is considered late.</a:t>
+              <a:t>Books above 500 pages are returned late than books with less than 50 pages. Also, the price of books is seen to have an impact on the late returns of books as more customers checkout books within 100.00 and 500.00 price range. However, 29% of customers who lives in Washington return books after 28 days which is considered late.</a:t>
             </a:r>
           </a:p>
           <a:p>
@@ -23561,12 +23612,6 @@
               </a:rPr>
               <a:t>For customers across different occupations, the Business &amp; Finance customers pool the highest proportion of late returned books.</a:t>
             </a:r>
-            <a:endParaRPr lang="en-US" sz="1200" dirty="0" smtClean="0">
-              <a:solidFill>
-                <a:srgbClr val="002060"/>
-              </a:solidFill>
-              <a:latin typeface="Corbel" panose="020B0503020204020204" pitchFamily="34" charset="0"/>
-            </a:endParaRPr>
           </a:p>
         </p:txBody>
       </p:sp>
@@ -31687,7 +31732,7 @@
           <a:graphicData uri="http://schemas.openxmlformats.org/presentationml/2006/ole">
             <mc:AlternateContent xmlns:mc="http://schemas.openxmlformats.org/markup-compatibility/2006">
               <mc:Choice xmlns:v="urn:schemas-microsoft-com:vml" Requires="v">
-                <p:oleObj spid="_x0000_s15373" name="think-cell Slide" r:id="rId5" imgW="444" imgH="443" progId="TCLayout.ActiveDocument.1">
+                <p:oleObj spid="_x0000_s15375" name="think-cell Slide" r:id="rId5" imgW="444" imgH="443" progId="TCLayout.ActiveDocument.1">
                   <p:embed/>
                 </p:oleObj>
               </mc:Choice>
@@ -32016,7 +32061,25 @@
                 </a:solidFill>
                 <a:latin typeface="Corbel" panose="020B0503020204020204" pitchFamily="34" charset="0"/>
               </a:rPr>
-              <a:t>For the all factors connected with the late return of books, minimum of 20p and £</a:t>
+              <a:t>All</a:t>
+            </a:r>
+            <a:r>
+              <a:rPr lang="en-US" sz="1700" dirty="0" smtClean="0">
+                <a:solidFill>
+                  <a:srgbClr val="002060"/>
+                </a:solidFill>
+                <a:latin typeface="Corbel" panose="020B0503020204020204" pitchFamily="34" charset="0"/>
+              </a:rPr>
+              <a:t> </a:t>
+            </a:r>
+            <a:r>
+              <a:rPr lang="en-US" sz="1700" dirty="0" smtClean="0">
+                <a:solidFill>
+                  <a:srgbClr val="002060"/>
+                </a:solidFill>
+                <a:latin typeface="Corbel" panose="020B0503020204020204" pitchFamily="34" charset="0"/>
+              </a:rPr>
+              <a:t>factors connected with the late return of books, minimum of 20p and £</a:t>
             </a:r>
             <a:r>
               <a:rPr lang="en-US" sz="1700" dirty="0">
@@ -32082,7 +32145,61 @@
                 </a:solidFill>
                 <a:latin typeface="Corbel" panose="020B0503020204020204" pitchFamily="34" charset="0"/>
               </a:rPr>
-              <a:t>Customer engage/intervention should be adopted towards borrowed book due dates. A “kind reminder” mail should be send to customers few days to their due date, stating the implication of overdue books and the charges incurred daily after their due dates.</a:t>
+              <a:t>Customer </a:t>
+            </a:r>
+            <a:r>
+              <a:rPr lang="en-US" sz="1700" dirty="0" smtClean="0">
+                <a:solidFill>
+                  <a:srgbClr val="002060"/>
+                </a:solidFill>
+                <a:latin typeface="Corbel" panose="020B0503020204020204" pitchFamily="34" charset="0"/>
+              </a:rPr>
+              <a:t>engagement/intervention </a:t>
+            </a:r>
+            <a:r>
+              <a:rPr lang="en-US" sz="1700" dirty="0" smtClean="0">
+                <a:solidFill>
+                  <a:srgbClr val="002060"/>
+                </a:solidFill>
+                <a:latin typeface="Corbel" panose="020B0503020204020204" pitchFamily="34" charset="0"/>
+              </a:rPr>
+              <a:t>should be adopted towards borrowed book due dates. A “kind reminder” mail should be </a:t>
+            </a:r>
+            <a:r>
+              <a:rPr lang="en-US" sz="1700" dirty="0" smtClean="0">
+                <a:solidFill>
+                  <a:srgbClr val="002060"/>
+                </a:solidFill>
+                <a:latin typeface="Corbel" panose="020B0503020204020204" pitchFamily="34" charset="0"/>
+              </a:rPr>
+              <a:t>sent </a:t>
+            </a:r>
+            <a:r>
+              <a:rPr lang="en-US" sz="1700" dirty="0" smtClean="0">
+                <a:solidFill>
+                  <a:srgbClr val="002060"/>
+                </a:solidFill>
+                <a:latin typeface="Corbel" panose="020B0503020204020204" pitchFamily="34" charset="0"/>
+              </a:rPr>
+              <a:t>to customers few days to their due </a:t>
+            </a:r>
+            <a:r>
+              <a:rPr lang="en-US" sz="1700" dirty="0" smtClean="0">
+                <a:solidFill>
+                  <a:srgbClr val="002060"/>
+                </a:solidFill>
+                <a:latin typeface="Corbel" panose="020B0503020204020204" pitchFamily="34" charset="0"/>
+              </a:rPr>
+              <a:t>dates, </a:t>
+            </a:r>
+            <a:r>
+              <a:rPr lang="en-US" sz="1700" dirty="0" smtClean="0">
+                <a:solidFill>
+                  <a:srgbClr val="002060"/>
+                </a:solidFill>
+                <a:latin typeface="Corbel" panose="020B0503020204020204" pitchFamily="34" charset="0"/>
+              </a:rPr>
+              <a:t>stating the implication of overdue books and the charges incurred daily after their due dates.</a:t>
             </a:r>
             <a:endParaRPr lang="en-US" sz="1700" dirty="0">
               <a:solidFill>
@@ -32169,7 +32286,7 @@
           <a:graphicData uri="http://schemas.openxmlformats.org/presentationml/2006/ole">
             <mc:AlternateContent xmlns:mc="http://schemas.openxmlformats.org/markup-compatibility/2006">
               <mc:Choice xmlns:v="urn:schemas-microsoft-com:vml" Requires="v">
-                <p:oleObj spid="_x0000_s16387" name="think-cell Slide" r:id="rId5" imgW="444" imgH="443" progId="TCLayout.ActiveDocument.1">
+                <p:oleObj spid="_x0000_s16389" name="think-cell Slide" r:id="rId5" imgW="444" imgH="443" progId="TCLayout.ActiveDocument.1">
                   <p:embed/>
                 </p:oleObj>
               </mc:Choice>

</xml_diff>